<commit_message>
refactoring notebooks, finished conclusion
</commit_message>
<xml_diff>
--- a/building_better_kickstarter_project.pptx
+++ b/building_better_kickstarter_project.pptx
@@ -4882,10 +4882,10 @@
       </p:pic>
       <p:pic>
         <p:nvPicPr>
-          <p:cNvPr id="2050" name="Picture 2">
-            <a:extLst>
-              <a:ext uri="{FF2B5EF4-FFF2-40B4-BE49-F238E27FC236}">
-                <a16:creationId xmlns:a16="http://schemas.microsoft.com/office/drawing/2014/main" id="{7A813FD4-62EC-471C-87E7-8DC39628FBF4}"/>
+          <p:cNvPr id="3" name="Picture 2">
+            <a:extLst>
+              <a:ext uri="{FF2B5EF4-FFF2-40B4-BE49-F238E27FC236}">
+                <a16:creationId xmlns:a16="http://schemas.microsoft.com/office/drawing/2014/main" id="{5F4CDB08-E4D2-480C-A28E-C1D6E60C4536}"/>
               </a:ext>
             </a:extLst>
           </p:cNvPr>
@@ -4909,7 +4909,7 @@
         </p:blipFill>
         <p:spPr bwMode="auto">
           <a:xfrm>
-            <a:off x="5087800" y="1689894"/>
+            <a:off x="5087800" y="1545166"/>
             <a:ext cx="6181725" cy="4724400"/>
           </a:xfrm>
           <a:prstGeom prst="rect">

</xml_diff>